<commit_message>
form submission and localstorage
</commit_message>
<xml_diff>
--- a/SHOOTING GAME.pptx
+++ b/SHOOTING GAME.pptx
@@ -264,7 +264,7 @@
           <a:p>
             <a:fld id="{CF533345-6EE4-4493-9A88-9FE38ED65B2C}" type="datetimeFigureOut">
               <a:rPr lang="en-IN" smtClean="0"/>
-              <a:t>06-11-2023</a:t>
+              <a:t>09-11-2023</a:t>
             </a:fld>
             <a:endParaRPr lang="en-IN" dirty="0"/>
           </a:p>
@@ -464,7 +464,7 @@
           <a:p>
             <a:fld id="{CF533345-6EE4-4493-9A88-9FE38ED65B2C}" type="datetimeFigureOut">
               <a:rPr lang="en-IN" smtClean="0"/>
-              <a:t>06-11-2023</a:t>
+              <a:t>09-11-2023</a:t>
             </a:fld>
             <a:endParaRPr lang="en-IN" dirty="0"/>
           </a:p>
@@ -674,7 +674,7 @@
           <a:p>
             <a:fld id="{CF533345-6EE4-4493-9A88-9FE38ED65B2C}" type="datetimeFigureOut">
               <a:rPr lang="en-IN" smtClean="0"/>
-              <a:t>06-11-2023</a:t>
+              <a:t>09-11-2023</a:t>
             </a:fld>
             <a:endParaRPr lang="en-IN" dirty="0"/>
           </a:p>
@@ -874,7 +874,7 @@
           <a:p>
             <a:fld id="{CF533345-6EE4-4493-9A88-9FE38ED65B2C}" type="datetimeFigureOut">
               <a:rPr lang="en-IN" smtClean="0"/>
-              <a:t>06-11-2023</a:t>
+              <a:t>09-11-2023</a:t>
             </a:fld>
             <a:endParaRPr lang="en-IN" dirty="0"/>
           </a:p>
@@ -1150,7 +1150,7 @@
           <a:p>
             <a:fld id="{CF533345-6EE4-4493-9A88-9FE38ED65B2C}" type="datetimeFigureOut">
               <a:rPr lang="en-IN" smtClean="0"/>
-              <a:t>06-11-2023</a:t>
+              <a:t>09-11-2023</a:t>
             </a:fld>
             <a:endParaRPr lang="en-IN" dirty="0"/>
           </a:p>
@@ -1418,7 +1418,7 @@
           <a:p>
             <a:fld id="{CF533345-6EE4-4493-9A88-9FE38ED65B2C}" type="datetimeFigureOut">
               <a:rPr lang="en-IN" smtClean="0"/>
-              <a:t>06-11-2023</a:t>
+              <a:t>09-11-2023</a:t>
             </a:fld>
             <a:endParaRPr lang="en-IN" dirty="0"/>
           </a:p>
@@ -1833,7 +1833,7 @@
           <a:p>
             <a:fld id="{CF533345-6EE4-4493-9A88-9FE38ED65B2C}" type="datetimeFigureOut">
               <a:rPr lang="en-IN" smtClean="0"/>
-              <a:t>06-11-2023</a:t>
+              <a:t>09-11-2023</a:t>
             </a:fld>
             <a:endParaRPr lang="en-IN" dirty="0"/>
           </a:p>
@@ -1975,7 +1975,7 @@
           <a:p>
             <a:fld id="{CF533345-6EE4-4493-9A88-9FE38ED65B2C}" type="datetimeFigureOut">
               <a:rPr lang="en-IN" smtClean="0"/>
-              <a:t>06-11-2023</a:t>
+              <a:t>09-11-2023</a:t>
             </a:fld>
             <a:endParaRPr lang="en-IN" dirty="0"/>
           </a:p>
@@ -2088,7 +2088,7 @@
           <a:p>
             <a:fld id="{CF533345-6EE4-4493-9A88-9FE38ED65B2C}" type="datetimeFigureOut">
               <a:rPr lang="en-IN" smtClean="0"/>
-              <a:t>06-11-2023</a:t>
+              <a:t>09-11-2023</a:t>
             </a:fld>
             <a:endParaRPr lang="en-IN" dirty="0"/>
           </a:p>
@@ -2401,7 +2401,7 @@
           <a:p>
             <a:fld id="{CF533345-6EE4-4493-9A88-9FE38ED65B2C}" type="datetimeFigureOut">
               <a:rPr lang="en-IN" smtClean="0"/>
-              <a:t>06-11-2023</a:t>
+              <a:t>09-11-2023</a:t>
             </a:fld>
             <a:endParaRPr lang="en-IN" dirty="0"/>
           </a:p>
@@ -2690,7 +2690,7 @@
           <a:p>
             <a:fld id="{CF533345-6EE4-4493-9A88-9FE38ED65B2C}" type="datetimeFigureOut">
               <a:rPr lang="en-IN" smtClean="0"/>
-              <a:t>06-11-2023</a:t>
+              <a:t>09-11-2023</a:t>
             </a:fld>
             <a:endParaRPr lang="en-IN" dirty="0"/>
           </a:p>
@@ -2933,7 +2933,7 @@
           <a:p>
             <a:fld id="{CF533345-6EE4-4493-9A88-9FE38ED65B2C}" type="datetimeFigureOut">
               <a:rPr lang="en-IN" smtClean="0"/>
-              <a:t>06-11-2023</a:t>
+              <a:t>09-11-2023</a:t>
             </a:fld>
             <a:endParaRPr lang="en-IN" dirty="0"/>
           </a:p>
@@ -3985,7 +3985,7 @@
         </p:spPr>
         <p:txBody>
           <a:bodyPr>
-            <a:normAutofit fontScale="85000" lnSpcReduction="20000"/>
+            <a:normAutofit fontScale="92500" lnSpcReduction="20000"/>
           </a:bodyPr>
           <a:lstStyle/>
           <a:p>
@@ -4021,7 +4021,7 @@
           <a:p>
             <a:r>
               <a:rPr lang="en-US" dirty="0"/>
-              <a:t>You reach a score of 15,30,45,60…..</a:t>
+              <a:t>You reach a score of 20,40,60…..</a:t>
             </a:r>
             <a:r>
               <a:rPr lang="en-US" dirty="0">
@@ -4031,7 +4031,7 @@
             </a:r>
             <a:r>
               <a:rPr lang="en-US" dirty="0"/>
-              <a:t>lives+=1</a:t>
+              <a:t>score+=10</a:t>
             </a:r>
           </a:p>
           <a:p>
@@ -4047,17 +4047,23 @@
                   <a:srgbClr val="FFFF00"/>
                 </a:highlight>
               </a:rPr>
-              <a:t>When score==25,50,75,100……</a:t>
-            </a:r>
-            <a:r>
-              <a:rPr lang="en-IN" dirty="0">
+              <a:t>When score==40,80,120….……</a:t>
+            </a:r>
+            <a:r>
+              <a:rPr lang="en-IN">
                 <a:highlight>
                   <a:srgbClr val="FFFF00"/>
                 </a:highlight>
                 <a:sym typeface="Wingdings" panose="05000000000000000000" pitchFamily="2" charset="2"/>
               </a:rPr>
-              <a:t>-invincibility duration for 5-10s if i.e. no lives-=1 if you miss in that duration</a:t>
-            </a:r>
+              <a:t>-life+=1</a:t>
+            </a:r>
+            <a:endParaRPr lang="en-IN" dirty="0">
+              <a:highlight>
+                <a:srgbClr val="FFFF00"/>
+              </a:highlight>
+              <a:sym typeface="Wingdings" panose="05000000000000000000" pitchFamily="2" charset="2"/>
+            </a:endParaRPr>
           </a:p>
           <a:p>
             <a:r>

</xml_diff>